<commit_message>
Fixed second presentation fonts. Changed word.
</commit_message>
<xml_diff>
--- a/media/MathematicalModelingOfEpidemology2.pptx
+++ b/media/MathematicalModelingOfEpidemology2.pptx
@@ -223,7 +223,7 @@
           <a:p>
             <a:fld id="{7591FDCE-226B-43A2-9D9B-27C41020CAE1}" type="datetimeFigureOut">
               <a:rPr lang="en-US" smtClean="0"/>
-              <a:t>24-May-17</a:t>
+              <a:t>25-May-17</a:t>
             </a:fld>
             <a:endParaRPr lang="en-US"/>
           </a:p>
@@ -318,7 +318,6 @@
               <a:rPr lang="en-US"/>
               <a:t>Fifth level</a:t>
             </a:r>
-            <a:endParaRPr lang="en-US"/>
           </a:p>
         </p:txBody>
       </p:sp>
@@ -1348,7 +1347,7 @@
             <a:fld id="{96DFF08F-DC6B-4601-B491-B0F83F6DD2DA}" type="datetimeFigureOut">
               <a:rPr lang="en-US" dirty="0"/>
               <a:pPr/>
-              <a:t>24-May-17</a:t>
+              <a:t>25-May-17</a:t>
             </a:fld>
             <a:endParaRPr lang="en-US" dirty="0"/>
           </a:p>
@@ -1565,7 +1564,7 @@
           <a:p>
             <a:fld id="{96DFF08F-DC6B-4601-B491-B0F83F6DD2DA}" type="datetimeFigureOut">
               <a:rPr lang="en-US" dirty="0"/>
-              <a:t>24-May-17</a:t>
+              <a:t>25-May-17</a:t>
             </a:fld>
             <a:endParaRPr lang="en-US" dirty="0"/>
           </a:p>
@@ -1740,7 +1739,7 @@
           <a:p>
             <a:fld id="{96DFF08F-DC6B-4601-B491-B0F83F6DD2DA}" type="datetimeFigureOut">
               <a:rPr lang="en-US" dirty="0"/>
-              <a:t>24-May-17</a:t>
+              <a:t>25-May-17</a:t>
             </a:fld>
             <a:endParaRPr lang="en-US" dirty="0"/>
           </a:p>
@@ -1926,7 +1925,7 @@
             <a:fld id="{96DFF08F-DC6B-4601-B491-B0F83F6DD2DA}" type="datetimeFigureOut">
               <a:rPr lang="en-US" smtClean="0"/>
               <a:pPr/>
-              <a:t>24-May-17</a:t>
+              <a:t>25-May-17</a:t>
             </a:fld>
             <a:endParaRPr lang="en-US" dirty="0"/>
           </a:p>
@@ -2095,7 +2094,7 @@
           <a:p>
             <a:fld id="{96DFF08F-DC6B-4601-B491-B0F83F6DD2DA}" type="datetimeFigureOut">
               <a:rPr lang="en-US" smtClean="0"/>
-              <a:t>24-May-17</a:t>
+              <a:t>25-May-17</a:t>
             </a:fld>
             <a:endParaRPr lang="en-US" dirty="0"/>
           </a:p>
@@ -2340,7 +2339,7 @@
           <a:p>
             <a:fld id="{96DFF08F-DC6B-4601-B491-B0F83F6DD2DA}" type="datetimeFigureOut">
               <a:rPr lang="en-US" smtClean="0"/>
-              <a:t>24-May-17</a:t>
+              <a:t>25-May-17</a:t>
             </a:fld>
             <a:endParaRPr lang="en-US" dirty="0"/>
           </a:p>
@@ -2569,7 +2568,7 @@
           <a:p>
             <a:fld id="{96DFF08F-DC6B-4601-B491-B0F83F6DD2DA}" type="datetimeFigureOut">
               <a:rPr lang="en-US" smtClean="0"/>
-              <a:t>24-May-17</a:t>
+              <a:t>25-May-17</a:t>
             </a:fld>
             <a:endParaRPr lang="en-US" dirty="0"/>
           </a:p>
@@ -2933,7 +2932,7 @@
           <a:p>
             <a:fld id="{96DFF08F-DC6B-4601-B491-B0F83F6DD2DA}" type="datetimeFigureOut">
               <a:rPr lang="en-US" smtClean="0"/>
-              <a:t>24-May-17</a:t>
+              <a:t>25-May-17</a:t>
             </a:fld>
             <a:endParaRPr lang="en-US" dirty="0"/>
           </a:p>
@@ -3050,7 +3049,7 @@
           <a:p>
             <a:fld id="{96DFF08F-DC6B-4601-B491-B0F83F6DD2DA}" type="datetimeFigureOut">
               <a:rPr lang="en-US" smtClean="0"/>
-              <a:t>24-May-17</a:t>
+              <a:t>25-May-17</a:t>
             </a:fld>
             <a:endParaRPr lang="en-US" dirty="0"/>
           </a:p>
@@ -3145,7 +3144,7 @@
           <a:p>
             <a:fld id="{96DFF08F-DC6B-4601-B491-B0F83F6DD2DA}" type="datetimeFigureOut">
               <a:rPr lang="en-US" smtClean="0"/>
-              <a:t>24-May-17</a:t>
+              <a:t>25-May-17</a:t>
             </a:fld>
             <a:endParaRPr lang="en-US" dirty="0"/>
           </a:p>
@@ -3420,7 +3419,7 @@
           <a:p>
             <a:fld id="{96DFF08F-DC6B-4601-B491-B0F83F6DD2DA}" type="datetimeFigureOut">
               <a:rPr lang="en-US" smtClean="0"/>
-              <a:t>24-May-17</a:t>
+              <a:t>25-May-17</a:t>
             </a:fld>
             <a:endParaRPr lang="en-US" dirty="0"/>
           </a:p>
@@ -3590,7 +3589,7 @@
           <a:p>
             <a:fld id="{96DFF08F-DC6B-4601-B491-B0F83F6DD2DA}" type="datetimeFigureOut">
               <a:rPr lang="en-US" dirty="0"/>
-              <a:t>24-May-17</a:t>
+              <a:t>25-May-17</a:t>
             </a:fld>
             <a:endParaRPr lang="en-US" dirty="0"/>
           </a:p>
@@ -3837,7 +3836,7 @@
           <a:p>
             <a:fld id="{96DFF08F-DC6B-4601-B491-B0F83F6DD2DA}" type="datetimeFigureOut">
               <a:rPr lang="en-US" smtClean="0"/>
-              <a:t>24-May-17</a:t>
+              <a:t>25-May-17</a:t>
             </a:fld>
             <a:endParaRPr lang="en-US" dirty="0"/>
           </a:p>
@@ -4005,7 +4004,7 @@
           <a:p>
             <a:fld id="{96DFF08F-DC6B-4601-B491-B0F83F6DD2DA}" type="datetimeFigureOut">
               <a:rPr lang="en-US" smtClean="0"/>
-              <a:t>24-May-17</a:t>
+              <a:t>25-May-17</a:t>
             </a:fld>
             <a:endParaRPr lang="en-US" dirty="0"/>
           </a:p>
@@ -4183,7 +4182,7 @@
           <a:p>
             <a:fld id="{96DFF08F-DC6B-4601-B491-B0F83F6DD2DA}" type="datetimeFigureOut">
               <a:rPr lang="en-US" smtClean="0"/>
-              <a:t>24-May-17</a:t>
+              <a:t>25-May-17</a:t>
             </a:fld>
             <a:endParaRPr lang="en-US" dirty="0"/>
           </a:p>
@@ -4434,7 +4433,7 @@
           <a:p>
             <a:fld id="{96DFF08F-DC6B-4601-B491-B0F83F6DD2DA}" type="datetimeFigureOut">
               <a:rPr lang="en-US" dirty="0"/>
-              <a:t>24-May-17</a:t>
+              <a:t>25-May-17</a:t>
             </a:fld>
             <a:endParaRPr lang="en-US" dirty="0"/>
           </a:p>
@@ -4752,7 +4751,7 @@
           <a:p>
             <a:fld id="{96DFF08F-DC6B-4601-B491-B0F83F6DD2DA}" type="datetimeFigureOut">
               <a:rPr lang="en-US" dirty="0"/>
-              <a:t>24-May-17</a:t>
+              <a:t>25-May-17</a:t>
             </a:fld>
             <a:endParaRPr lang="en-US" dirty="0"/>
           </a:p>
@@ -5171,7 +5170,7 @@
           <a:p>
             <a:fld id="{96DFF08F-DC6B-4601-B491-B0F83F6DD2DA}" type="datetimeFigureOut">
               <a:rPr lang="en-US" dirty="0"/>
-              <a:t>24-May-17</a:t>
+              <a:t>25-May-17</a:t>
             </a:fld>
             <a:endParaRPr lang="en-US" dirty="0"/>
           </a:p>
@@ -5284,7 +5283,7 @@
           <a:p>
             <a:fld id="{96DFF08F-DC6B-4601-B491-B0F83F6DD2DA}" type="datetimeFigureOut">
               <a:rPr lang="en-US" dirty="0"/>
-              <a:t>24-May-17</a:t>
+              <a:t>25-May-17</a:t>
             </a:fld>
             <a:endParaRPr lang="en-US" dirty="0"/>
           </a:p>
@@ -5374,7 +5373,7 @@
           <a:p>
             <a:fld id="{96DFF08F-DC6B-4601-B491-B0F83F6DD2DA}" type="datetimeFigureOut">
               <a:rPr lang="en-US" dirty="0"/>
-              <a:t>24-May-17</a:t>
+              <a:t>25-May-17</a:t>
             </a:fld>
             <a:endParaRPr lang="en-US" dirty="0"/>
           </a:p>
@@ -5659,7 +5658,7 @@
           <a:p>
             <a:fld id="{96DFF08F-DC6B-4601-B491-B0F83F6DD2DA}" type="datetimeFigureOut">
               <a:rPr lang="en-US" dirty="0"/>
-              <a:t>24-May-17</a:t>
+              <a:t>25-May-17</a:t>
             </a:fld>
             <a:endParaRPr lang="en-US" dirty="0"/>
           </a:p>
@@ -5926,7 +5925,7 @@
           <a:p>
             <a:fld id="{96DFF08F-DC6B-4601-B491-B0F83F6DD2DA}" type="datetimeFigureOut">
               <a:rPr lang="en-US" dirty="0"/>
-              <a:t>24-May-17</a:t>
+              <a:t>25-May-17</a:t>
             </a:fld>
             <a:endParaRPr lang="en-US" dirty="0"/>
           </a:p>
@@ -6181,7 +6180,7 @@
             <a:fld id="{96DFF08F-DC6B-4601-B491-B0F83F6DD2DA}" type="datetimeFigureOut">
               <a:rPr lang="en-US" dirty="0"/>
               <a:pPr/>
-              <a:t>24-May-17</a:t>
+              <a:t>25-May-17</a:t>
             </a:fld>
             <a:endParaRPr lang="en-US" dirty="0"/>
           </a:p>
@@ -6772,7 +6771,7 @@
             <a:fld id="{96DFF08F-DC6B-4601-B491-B0F83F6DD2DA}" type="datetimeFigureOut">
               <a:rPr lang="en-US" smtClean="0"/>
               <a:pPr/>
-              <a:t>24-May-17</a:t>
+              <a:t>25-May-17</a:t>
             </a:fld>
             <a:endParaRPr lang="en-US" dirty="0"/>
           </a:p>
@@ -7524,7 +7523,7 @@
             </a:pPr>
             <a:r>
               <a:rPr lang="bg-BG" sz="6600">
-                <a:latin typeface="Trebuchet MS"/>
+                <a:latin typeface="Trebuchet MS" panose="020B0603020202020204" pitchFamily="34" charset="0"/>
                 <a:ea typeface="Trebuchet MS"/>
                 <a:cs typeface="Trebuchet MS"/>
                 <a:sym typeface="Trebuchet MS"/>
@@ -7622,7 +7621,9 @@
               <a:buNone/>
             </a:pPr>
             <a:r>
-              <a:rPr lang="bg-BG" sz="2400"/>
+              <a:rPr lang="bg-BG" sz="2400">
+                <a:latin typeface="Trebuchet MS" panose="020B0603020202020204" pitchFamily="34" charset="0"/>
+              </a:rPr>
               <a:t>Добавяне на нови групи.</a:t>
             </a:r>
           </a:p>
@@ -7634,7 +7635,9 @@
               <a:buNone/>
             </a:pPr>
             <a:r>
-              <a:rPr lang="bg-BG" sz="2400"/>
+              <a:rPr lang="bg-BG" sz="2400">
+                <a:latin typeface="Trebuchet MS" panose="020B0603020202020204" pitchFamily="34" charset="0"/>
+              </a:rPr>
               <a:t>Добавяне на раждаемост и смъртност.</a:t>
             </a:r>
           </a:p>
@@ -7646,7 +7649,9 @@
               <a:buNone/>
             </a:pPr>
             <a:r>
-              <a:rPr lang="bg-BG" sz="2400"/>
+              <a:rPr lang="bg-BG" sz="2400">
+                <a:latin typeface="Trebuchet MS" panose="020B0603020202020204" pitchFamily="34" charset="0"/>
+              </a:rPr>
               <a:t>Пренасяне на заразата в пространството.</a:t>
             </a:r>
           </a:p>
@@ -9723,8 +9728,8 @@
           </a:p>
         </p:txBody>
       </p:sp>
-      <mc:AlternateContent xmlns:mc="http://schemas.openxmlformats.org/markup-compatibility/2006" xmlns:a14="http://schemas.microsoft.com/office/drawing/2010/main">
-        <mc:Choice Requires="a14">
+      <mc:AlternateContent xmlns:mc="http://schemas.openxmlformats.org/markup-compatibility/2006">
+        <mc:Choice xmlns:a14="http://schemas.microsoft.com/office/drawing/2010/main" Requires="a14">
           <p:sp>
             <p:nvSpPr>
               <p:cNvPr id="3" name="Content Placeholder 2"/>
@@ -10100,7 +10105,7 @@
             </p:txBody>
           </p:sp>
         </mc:Choice>
-        <mc:Fallback xmlns="">
+        <mc:Fallback>
           <p:sp>
             <p:nvSpPr>
               <p:cNvPr id="3" name="Content Placeholder 2"/>
@@ -10194,7 +10199,9 @@
           <a:p>
             <a:pPr algn="ctr"/>
             <a:r>
-              <a:rPr lang="en-US" sz="6500" dirty="0"/>
+              <a:rPr lang="en-US" sz="6500" dirty="0">
+                <a:latin typeface="Trebuchet MS" panose="020B0603020202020204" pitchFamily="34" charset="0"/>
+              </a:rPr>
               <a:t>S</a:t>
             </a:r>
           </a:p>
@@ -10253,7 +10260,9 @@
           <a:p>
             <a:pPr algn="ctr"/>
             <a:r>
-              <a:rPr lang="en-US" sz="6500" dirty="0"/>
+              <a:rPr lang="en-US" sz="6500" dirty="0">
+                <a:latin typeface="Trebuchet MS" panose="020B0603020202020204" pitchFamily="34" charset="0"/>
+              </a:rPr>
               <a:t>I</a:t>
             </a:r>
           </a:p>
@@ -10312,7 +10321,9 @@
           <a:p>
             <a:pPr algn="ctr"/>
             <a:r>
-              <a:rPr lang="en-US" sz="6500" dirty="0"/>
+              <a:rPr lang="en-US" sz="6500" dirty="0">
+                <a:latin typeface="Trebuchet MS" panose="020B0603020202020204" pitchFamily="34" charset="0"/>
+              </a:rPr>
               <a:t>R</a:t>
             </a:r>
           </a:p>
@@ -10651,7 +10662,7 @@
                     <a:lumOff val="15000"/>
                   </a:schemeClr>
                 </a:solidFill>
-                <a:latin typeface="Times New Roman" panose="02020603050405020304" pitchFamily="18" charset="0"/>
+                <a:latin typeface="Trebuchet MS" panose="020B0603020202020204" pitchFamily="34" charset="0"/>
                 <a:cs typeface="Times New Roman" panose="02020603050405020304" pitchFamily="18" charset="0"/>
               </a:rPr>
               <a:t>β</a:t>
@@ -10663,7 +10674,7 @@
                   <a:lumOff val="15000"/>
                 </a:schemeClr>
               </a:solidFill>
-              <a:latin typeface="Times New Roman" panose="02020603050405020304" pitchFamily="18" charset="0"/>
+              <a:latin typeface="Trebuchet MS" panose="020B0603020202020204" pitchFamily="34" charset="0"/>
               <a:cs typeface="Times New Roman" panose="02020603050405020304" pitchFamily="18" charset="0"/>
             </a:endParaRPr>
           </a:p>
@@ -10930,7 +10941,7 @@
                     <a:lumOff val="15000"/>
                   </a:schemeClr>
                 </a:solidFill>
-                <a:latin typeface="Times New Roman" panose="02020603050405020304" pitchFamily="18" charset="0"/>
+                <a:latin typeface="Trebuchet MS" panose="020B0603020202020204" pitchFamily="34" charset="0"/>
                 <a:cs typeface="Times New Roman" panose="02020603050405020304" pitchFamily="18" charset="0"/>
               </a:rPr>
               <a:t>α</a:t>
@@ -10942,7 +10953,7 @@
                   <a:lumOff val="15000"/>
                 </a:schemeClr>
               </a:solidFill>
-              <a:latin typeface="Times New Roman" panose="02020603050405020304" pitchFamily="18" charset="0"/>
+              <a:latin typeface="Trebuchet MS" panose="020B0603020202020204" pitchFamily="34" charset="0"/>
               <a:cs typeface="Times New Roman" panose="02020603050405020304" pitchFamily="18" charset="0"/>
             </a:endParaRPr>
           </a:p>
@@ -11167,7 +11178,7 @@
         </p:blipFill>
         <p:spPr>
           <a:xfrm>
-            <a:off x="5808932" y="1965960"/>
+            <a:off x="5808932" y="1948376"/>
             <a:ext cx="6178793" cy="4692884"/>
           </a:xfrm>
           <a:prstGeom prst="rect">
@@ -11186,6 +11197,10 @@
           </p:nvPr>
         </p:nvSpPr>
         <p:spPr>
+          <a:xfrm>
+            <a:off x="1143000" y="592016"/>
+            <a:ext cx="9875520" cy="1356360"/>
+          </a:xfrm>
           <a:ln w="12700">
             <a:noFill/>
           </a:ln>
@@ -11208,8 +11223,8 @@
           </a:p>
         </p:txBody>
       </p:sp>
-      <mc:AlternateContent xmlns:mc="http://schemas.openxmlformats.org/markup-compatibility/2006" xmlns:a14="http://schemas.microsoft.com/office/drawing/2010/main">
-        <mc:Choice Requires="a14">
+      <mc:AlternateContent xmlns:mc="http://schemas.openxmlformats.org/markup-compatibility/2006">
+        <mc:Choice xmlns:a14="http://schemas.microsoft.com/office/drawing/2010/main" Requires="a14">
           <p:sp>
             <p:nvSpPr>
               <p:cNvPr id="3" name="TextBox 2"/>
@@ -11218,7 +11233,7 @@
             </p:nvSpPr>
             <p:spPr>
               <a:xfrm>
-                <a:off x="931985" y="2145324"/>
+                <a:off x="931985" y="2127740"/>
                 <a:ext cx="2233246" cy="1200329"/>
               </a:xfrm>
               <a:prstGeom prst="rect">
@@ -11536,12 +11551,14 @@
                 </a:endParaRPr>
               </a:p>
               <a:p>
-                <a:endParaRPr lang="en-US" sz="2400" dirty="0"/>
+                <a:endParaRPr lang="en-US" sz="2400" dirty="0">
+                  <a:latin typeface="Trebuchet MS" panose="020B0603020202020204" pitchFamily="34" charset="0"/>
+                </a:endParaRPr>
               </a:p>
             </p:txBody>
           </p:sp>
         </mc:Choice>
-        <mc:Fallback xmlns="">
+        <mc:Fallback>
           <p:sp>
             <p:nvSpPr>
               <p:cNvPr id="3" name="TextBox 2"/>
@@ -11552,7 +11569,7 @@
             </p:nvSpPr>
             <p:spPr>
               <a:xfrm>
-                <a:off x="931985" y="2145324"/>
+                <a:off x="931985" y="2127740"/>
                 <a:ext cx="2233246" cy="1200329"/>
               </a:xfrm>
               <a:prstGeom prst="rect">
@@ -11580,8 +11597,8 @@
           </p:sp>
         </mc:Fallback>
       </mc:AlternateContent>
-      <mc:AlternateContent xmlns:mc="http://schemas.openxmlformats.org/markup-compatibility/2006" xmlns:a14="http://schemas.microsoft.com/office/drawing/2010/main">
-        <mc:Choice Requires="a14">
+      <mc:AlternateContent xmlns:mc="http://schemas.openxmlformats.org/markup-compatibility/2006">
+        <mc:Choice xmlns:a14="http://schemas.microsoft.com/office/drawing/2010/main" Requires="a14">
           <p:sp>
             <p:nvSpPr>
               <p:cNvPr id="5" name="TextBox 4"/>
@@ -11590,7 +11607,7 @@
             </p:nvSpPr>
             <p:spPr>
               <a:xfrm>
-                <a:off x="931985" y="3141706"/>
+                <a:off x="931985" y="3124122"/>
                 <a:ext cx="4598376" cy="2031325"/>
               </a:xfrm>
               <a:prstGeom prst="rect">
@@ -12047,7 +12064,7 @@
             </p:txBody>
           </p:sp>
         </mc:Choice>
-        <mc:Fallback xmlns="">
+        <mc:Fallback>
           <p:sp>
             <p:nvSpPr>
               <p:cNvPr id="5" name="TextBox 4"/>
@@ -12058,7 +12075,7 @@
             </p:nvSpPr>
             <p:spPr>
               <a:xfrm>
-                <a:off x="931985" y="3141706"/>
+                <a:off x="931985" y="3124122"/>
                 <a:ext cx="4598376" cy="2031325"/>
               </a:xfrm>
               <a:prstGeom prst="rect">
@@ -12086,8 +12103,8 @@
           </p:sp>
         </mc:Fallback>
       </mc:AlternateContent>
-      <mc:AlternateContent xmlns:mc="http://schemas.openxmlformats.org/markup-compatibility/2006" xmlns:a14="http://schemas.microsoft.com/office/drawing/2010/main">
-        <mc:Choice Requires="a14">
+      <mc:AlternateContent xmlns:mc="http://schemas.openxmlformats.org/markup-compatibility/2006">
+        <mc:Choice xmlns:a14="http://schemas.microsoft.com/office/drawing/2010/main" Requires="a14">
           <p:sp>
             <p:nvSpPr>
               <p:cNvPr id="6" name="TextBox 5"/>
@@ -12096,8 +12113,8 @@
             </p:nvSpPr>
             <p:spPr>
               <a:xfrm>
-                <a:off x="931985" y="5355472"/>
-                <a:ext cx="3081613" cy="813941"/>
+                <a:off x="931985" y="5337888"/>
+                <a:ext cx="3246914" cy="813941"/>
               </a:xfrm>
               <a:prstGeom prst="rect">
                 <a:avLst/>
@@ -12169,20 +12186,7 @@
                         <a:latin typeface="Cambria Math" panose="02040503050406030204" pitchFamily="18" charset="0"/>
                         <a:ea typeface="Cambria Math" panose="02040503050406030204" pitchFamily="18" charset="0"/>
                       </a:rPr>
-                      <m:t>&lt;</m:t>
-                    </m:r>
-                    <m:r>
-                      <a:rPr lang="en-US" sz="2400" b="0" i="1" smtClean="0">
-                        <a:solidFill>
-                          <a:schemeClr val="tx1">
-                            <a:lumMod val="85000"/>
-                            <a:lumOff val="15000"/>
-                          </a:schemeClr>
-                        </a:solidFill>
-                        <a:latin typeface="Cambria Math" panose="02040503050406030204" pitchFamily="18" charset="0"/>
-                        <a:ea typeface="Cambria Math" panose="02040503050406030204" pitchFamily="18" charset="0"/>
-                      </a:rPr>
-                      <m:t>1</m:t>
+                      <m:t>&lt;1</m:t>
                     </m:r>
                   </m:oMath>
                 </a14:m>
@@ -12194,6 +12198,7 @@
                         <a:lumOff val="15000"/>
                       </a:schemeClr>
                     </a:solidFill>
+                    <a:latin typeface="Trebuchet MS" panose="020B0603020202020204" pitchFamily="34" charset="0"/>
                     <a:ea typeface="Cambria Math" panose="02040503050406030204" pitchFamily="18" charset="0"/>
                   </a:rPr>
                   <a:t> – няма епидемия </a:t>
@@ -12205,6 +12210,7 @@
                       <a:lumOff val="15000"/>
                     </a:schemeClr>
                   </a:solidFill>
+                  <a:latin typeface="Trebuchet MS" panose="020B0603020202020204" pitchFamily="34" charset="0"/>
                   <a:ea typeface="Cambria Math" panose="02040503050406030204" pitchFamily="18" charset="0"/>
                 </a:endParaRPr>
               </a:p>
@@ -12268,20 +12274,7 @@
                         <a:latin typeface="Cambria Math" panose="02040503050406030204" pitchFamily="18" charset="0"/>
                         <a:ea typeface="Cambria Math" panose="02040503050406030204" pitchFamily="18" charset="0"/>
                       </a:rPr>
-                      <m:t>&gt;</m:t>
-                    </m:r>
-                    <m:r>
-                      <a:rPr lang="en-US" sz="2400" i="1">
-                        <a:solidFill>
-                          <a:schemeClr val="tx1">
-                            <a:lumMod val="85000"/>
-                            <a:lumOff val="15000"/>
-                          </a:schemeClr>
-                        </a:solidFill>
-                        <a:latin typeface="Cambria Math" panose="02040503050406030204" pitchFamily="18" charset="0"/>
-                        <a:ea typeface="Cambria Math" panose="02040503050406030204" pitchFamily="18" charset="0"/>
-                      </a:rPr>
-                      <m:t>1</m:t>
+                      <m:t>&gt;1</m:t>
                     </m:r>
                     <m:r>
                       <a:rPr lang="bg-BG" sz="2400" b="0" i="1" smtClean="0">
@@ -12306,24 +12299,31 @@
                         <a:lumOff val="15000"/>
                       </a:schemeClr>
                     </a:solidFill>
+                    <a:latin typeface="Trebuchet MS" panose="020B0603020202020204" pitchFamily="34" charset="0"/>
                     <a:ea typeface="Cambria Math" panose="02040503050406030204" pitchFamily="18" charset="0"/>
                   </a:rPr>
                   <a:t>–</a:t>
                 </a:r>
                 <a:r>
-                  <a:rPr lang="bg-BG" sz="2000" dirty="0"/>
+                  <a:rPr lang="bg-BG" sz="2000" dirty="0">
+                    <a:latin typeface="Trebuchet MS" panose="020B0603020202020204" pitchFamily="34" charset="0"/>
+                  </a:rPr>
                   <a:t> има епидемия</a:t>
                 </a:r>
                 <a:r>
-                  <a:rPr lang="bg-BG" sz="1600" dirty="0"/>
+                  <a:rPr lang="bg-BG" sz="1600" dirty="0">
+                    <a:latin typeface="Trebuchet MS" panose="020B0603020202020204" pitchFamily="34" charset="0"/>
+                  </a:rPr>
                   <a:t> </a:t>
                 </a:r>
-                <a:endParaRPr lang="en-US" dirty="0"/>
+                <a:endParaRPr lang="en-US" dirty="0">
+                  <a:latin typeface="Trebuchet MS" panose="020B0603020202020204" pitchFamily="34" charset="0"/>
+                </a:endParaRPr>
               </a:p>
             </p:txBody>
           </p:sp>
         </mc:Choice>
-        <mc:Fallback xmlns="">
+        <mc:Fallback>
           <p:sp>
             <p:nvSpPr>
               <p:cNvPr id="6" name="TextBox 5"/>
@@ -12334,8 +12334,8 @@
             </p:nvSpPr>
             <p:spPr>
               <a:xfrm>
-                <a:off x="931985" y="5355472"/>
-                <a:ext cx="3081613" cy="813941"/>
+                <a:off x="931985" y="5337888"/>
+                <a:ext cx="3246914" cy="813941"/>
               </a:xfrm>
               <a:prstGeom prst="rect">
                 <a:avLst/>
@@ -12343,7 +12343,7 @@
               <a:blipFill>
                 <a:blip r:embed="rId5"/>
                 <a:stretch>
-                  <a:fillRect l="-594" r="-1188" b="-12782"/>
+                  <a:fillRect l="-563" r="-938" b="-11278"/>
                 </a:stretch>
               </a:blipFill>
             </p:spPr>
@@ -12362,8 +12362,8 @@
           </p:sp>
         </mc:Fallback>
       </mc:AlternateContent>
-      <mc:AlternateContent xmlns:mc="http://schemas.openxmlformats.org/markup-compatibility/2006" xmlns:a14="http://schemas.microsoft.com/office/drawing/2010/main">
-        <mc:Choice Requires="a14">
+      <mc:AlternateContent xmlns:mc="http://schemas.openxmlformats.org/markup-compatibility/2006">
+        <mc:Choice xmlns:a14="http://schemas.microsoft.com/office/drawing/2010/main" Requires="a14">
           <p:sp>
             <p:nvSpPr>
               <p:cNvPr id="7" name="TextBox 6"/>
@@ -12372,8 +12372,8 @@
             </p:nvSpPr>
             <p:spPr>
               <a:xfrm>
-                <a:off x="931985" y="4856855"/>
-                <a:ext cx="1869166" cy="830997"/>
+                <a:off x="931985" y="4839271"/>
+                <a:ext cx="1924566" cy="830997"/>
               </a:xfrm>
               <a:prstGeom prst="rect">
                 <a:avLst/>
@@ -12557,12 +12557,14 @@
                 </a:endParaRPr>
               </a:p>
               <a:p>
-                <a:endParaRPr lang="en-US" sz="2400" dirty="0"/>
+                <a:endParaRPr lang="en-US" sz="2400" dirty="0">
+                  <a:latin typeface="Trebuchet MS" panose="020B0603020202020204" pitchFamily="34" charset="0"/>
+                </a:endParaRPr>
               </a:p>
             </p:txBody>
           </p:sp>
         </mc:Choice>
-        <mc:Fallback xmlns="">
+        <mc:Fallback>
           <p:sp>
             <p:nvSpPr>
               <p:cNvPr id="7" name="TextBox 6"/>
@@ -12573,8 +12575,8 @@
             </p:nvSpPr>
             <p:spPr>
               <a:xfrm>
-                <a:off x="931985" y="4856855"/>
-                <a:ext cx="1869166" cy="830997"/>
+                <a:off x="931985" y="4839271"/>
+                <a:ext cx="1924566" cy="830997"/>
               </a:xfrm>
               <a:prstGeom prst="rect">
                 <a:avLst/>
@@ -12685,61 +12687,57 @@
           <a:lstStyle/>
           <a:p>
             <a:pPr lvl="0">
-              <a:lnSpc>
-                <a:spcPct val="115000"/>
-              </a:lnSpc>
               <a:spcBef>
                 <a:spcPts val="0"/>
               </a:spcBef>
               <a:buNone/>
             </a:pPr>
             <a:r>
-              <a:rPr lang="bg-BG" sz="2400" dirty="0"/>
+              <a:rPr lang="bg-BG" sz="2400" dirty="0">
+                <a:latin typeface="Trebuchet MS" panose="020B0603020202020204" pitchFamily="34" charset="0"/>
+              </a:rPr>
               <a:t>Намира най-близкия локален минимум.</a:t>
             </a:r>
           </a:p>
           <a:p>
             <a:pPr lvl="0">
-              <a:lnSpc>
-                <a:spcPct val="115000"/>
-              </a:lnSpc>
               <a:spcBef>
                 <a:spcPts val="0"/>
               </a:spcBef>
               <a:buNone/>
             </a:pPr>
             <a:r>
-              <a:rPr lang="bg-BG" sz="2400" dirty="0"/>
+              <a:rPr lang="bg-BG" sz="2400" dirty="0">
+                <a:latin typeface="Trebuchet MS" panose="020B0603020202020204" pitchFamily="34" charset="0"/>
+              </a:rPr>
               <a:t>Трябва му начална точка.</a:t>
             </a:r>
           </a:p>
           <a:p>
             <a:pPr lvl="0">
-              <a:lnSpc>
-                <a:spcPct val="115000"/>
-              </a:lnSpc>
               <a:spcBef>
                 <a:spcPts val="0"/>
               </a:spcBef>
               <a:buNone/>
             </a:pPr>
             <a:r>
-              <a:rPr lang="bg-BG" sz="2400" dirty="0"/>
+              <a:rPr lang="bg-BG" sz="2400" dirty="0">
+                <a:latin typeface="Trebuchet MS" panose="020B0603020202020204" pitchFamily="34" charset="0"/>
+              </a:rPr>
               <a:t>Итеративен алгоритъм.</a:t>
             </a:r>
           </a:p>
           <a:p>
             <a:pPr lvl="0">
-              <a:lnSpc>
-                <a:spcPct val="115000"/>
-              </a:lnSpc>
               <a:spcBef>
                 <a:spcPts val="0"/>
               </a:spcBef>
               <a:buNone/>
             </a:pPr>
             <a:r>
-              <a:rPr lang="bg-BG" sz="2400" dirty="0"/>
+              <a:rPr lang="bg-BG" sz="2400" dirty="0">
+                <a:latin typeface="Trebuchet MS" panose="020B0603020202020204" pitchFamily="34" charset="0"/>
+              </a:rPr>
               <a:t>Всяка следващата точка се изчислява използвайки градиента на функцията.</a:t>
             </a:r>
           </a:p>
@@ -12840,8 +12838,8 @@
           </a:p>
         </p:txBody>
       </p:sp>
-      <mc:AlternateContent xmlns:mc="http://schemas.openxmlformats.org/markup-compatibility/2006">
-        <mc:Choice xmlns:a14="http://schemas.microsoft.com/office/drawing/2010/main" Requires="a14">
+      <mc:AlternateContent xmlns:mc="http://schemas.openxmlformats.org/markup-compatibility/2006" xmlns:a14="http://schemas.microsoft.com/office/drawing/2010/main">
+        <mc:Choice Requires="a14">
           <p:sp>
             <p:nvSpPr>
               <p:cNvPr id="2" name="Rectangle 1"/>
@@ -13012,7 +13010,7 @@
             </p:txBody>
           </p:sp>
         </mc:Choice>
-        <mc:Fallback>
+        <mc:Fallback xmlns="">
           <p:sp>
             <p:nvSpPr>
               <p:cNvPr id="2" name="Rectangle 1"/>
@@ -13107,65 +13105,17 @@
           <a:lstStyle/>
           <a:p>
             <a:pPr lvl="0">
-              <a:lnSpc>
-                <a:spcPct val="115000"/>
-              </a:lnSpc>
               <a:spcBef>
                 <a:spcPts val="0"/>
               </a:spcBef>
               <a:buNone/>
             </a:pPr>
             <a:r>
-              <a:rPr lang="bg-BG" sz="2400" dirty="0"/>
-              <a:t>Намира функция която най-добре приближава множество точки.</a:t>
-            </a:r>
-          </a:p>
-          <a:p>
-            <a:pPr lvl="0">
-              <a:lnSpc>
-                <a:spcPct val="115000"/>
-              </a:lnSpc>
-              <a:spcBef>
-                <a:spcPts val="0"/>
-              </a:spcBef>
-              <a:buNone/>
-            </a:pPr>
-            <a:r>
-              <a:rPr lang="bg-BG" sz="2400" dirty="0"/>
-              <a:t>Разликата се взима на квадрат</a:t>
-            </a:r>
-            <a:r>
-              <a:rPr lang="en-US" sz="2400" dirty="0"/>
-              <a:t> </a:t>
-            </a:r>
-            <a:r>
-              <a:rPr lang="bg-BG" sz="2400" dirty="0"/>
-              <a:t>и се сумира.</a:t>
-            </a:r>
-          </a:p>
-          <a:p>
-            <a:pPr lvl="0">
-              <a:lnSpc>
-                <a:spcPct val="115000"/>
-              </a:lnSpc>
-              <a:spcBef>
-                <a:spcPts val="0"/>
-              </a:spcBef>
-              <a:buNone/>
-            </a:pPr>
-            <a:endParaRPr lang="bg-BG" sz="2400" dirty="0"/>
-          </a:p>
-          <a:p>
-            <a:pPr lvl="0">
-              <a:lnSpc>
-                <a:spcPct val="115000"/>
-              </a:lnSpc>
-              <a:spcBef>
-                <a:spcPts val="0"/>
-              </a:spcBef>
-              <a:buNone/>
-            </a:pPr>
-            <a:endParaRPr lang="bg-BG" sz="2400" dirty="0"/>
+              <a:rPr lang="bg-BG" sz="2400" dirty="0">
+                <a:latin typeface="Trebuchet MS" panose="020B0603020202020204" pitchFamily="34" charset="0"/>
+              </a:rPr>
+              <a:t>Казва ни колко добре една функция приближава истинските данни.</a:t>
+            </a:r>
           </a:p>
           <a:p>
             <a:pPr lvl="0">
@@ -13174,7 +13124,24 @@
               </a:spcBef>
               <a:buNone/>
             </a:pPr>
-            <a:endParaRPr lang="bg-BG" dirty="0"/>
+            <a:r>
+              <a:rPr lang="bg-BG" sz="2400" dirty="0">
+                <a:latin typeface="Trebuchet MS" panose="020B0603020202020204" pitchFamily="34" charset="0"/>
+              </a:rPr>
+              <a:t>Разликата се взима на квадрат</a:t>
+            </a:r>
+            <a:r>
+              <a:rPr lang="en-US" sz="2400" dirty="0">
+                <a:latin typeface="Trebuchet MS" panose="020B0603020202020204" pitchFamily="34" charset="0"/>
+              </a:rPr>
+              <a:t> </a:t>
+            </a:r>
+            <a:r>
+              <a:rPr lang="bg-BG" sz="2400" dirty="0">
+                <a:latin typeface="Trebuchet MS" panose="020B0603020202020204" pitchFamily="34" charset="0"/>
+              </a:rPr>
+              <a:t>и се сумира.</a:t>
+            </a:r>
           </a:p>
           <a:p>
             <a:pPr lvl="0">
@@ -13183,7 +13150,9 @@
               </a:spcBef>
               <a:buNone/>
             </a:pPr>
-            <a:endParaRPr lang="bg-BG" dirty="0"/>
+            <a:endParaRPr lang="bg-BG" dirty="0">
+              <a:latin typeface="Trebuchet MS" panose="020B0603020202020204" pitchFamily="34" charset="0"/>
+            </a:endParaRPr>
           </a:p>
         </p:txBody>
       </p:sp>
@@ -13324,13 +13293,13 @@
               <a:t> </a:t>
             </a:r>
             <a:r>
-              <a:rPr lang="bg-BG" sz="6600" dirty="0" err="1">
+              <a:rPr lang="en-US" sz="6600" dirty="0">
                 <a:latin typeface="Trebuchet MS"/>
                 <a:ea typeface="Trebuchet MS"/>
                 <a:cs typeface="Trebuchet MS"/>
                 <a:sym typeface="Trebuchet MS"/>
               </a:rPr>
-              <a:t>Method</a:t>
+              <a:t>Criteria</a:t>
             </a:r>
             <a:endParaRPr lang="en-US" sz="6600" dirty="0">
               <a:latin typeface="Trebuchet MS" panose="020B0603020202020204" pitchFamily="34" charset="0"/>
@@ -13338,8 +13307,8 @@
           </a:p>
         </p:txBody>
       </p:sp>
-      <mc:AlternateContent xmlns:mc="http://schemas.openxmlformats.org/markup-compatibility/2006">
-        <mc:Choice xmlns:a14="http://schemas.microsoft.com/office/drawing/2010/main" Requires="a14">
+      <mc:AlternateContent xmlns:mc="http://schemas.openxmlformats.org/markup-compatibility/2006" xmlns:a14="http://schemas.microsoft.com/office/drawing/2010/main">
+        <mc:Choice Requires="a14">
           <p:sp>
             <p:nvSpPr>
               <p:cNvPr id="3" name="Rectangle 2"/>
@@ -13361,6 +13330,7 @@
               </a:bodyPr>
               <a:lstStyle/>
               <a:p>
+                <a:pPr/>
                 <a14:m>
                   <m:oMathPara xmlns:m="http://schemas.openxmlformats.org/officeDocument/2006/math">
                     <m:oMathParaPr>
@@ -13507,7 +13477,7 @@
             </p:txBody>
           </p:sp>
         </mc:Choice>
-        <mc:Fallback>
+        <mc:Fallback xmlns="">
           <p:sp>
             <p:nvSpPr>
               <p:cNvPr id="3" name="Rectangle 2"/>
@@ -13599,14 +13569,20 @@
                   </m:oMath>
                 </a14:m>
                 <a:r>
-                  <a:rPr lang="bg-BG" sz="2400" dirty="0"/>
+                  <a:rPr lang="bg-BG" sz="2400" dirty="0">
+                    <a:latin typeface="Trebuchet MS" panose="020B0603020202020204" pitchFamily="34" charset="0"/>
+                  </a:rPr>
                   <a:t> - истинските данни в даден момент </a:t>
                 </a:r>
                 <a:r>
-                  <a:rPr lang="en-US" sz="2400" dirty="0" err="1"/>
+                  <a:rPr lang="en-US" sz="2400" dirty="0" err="1">
+                    <a:latin typeface="Trebuchet MS" panose="020B0603020202020204" pitchFamily="34" charset="0"/>
+                  </a:rPr>
                   <a:t>i</a:t>
                 </a:r>
-                <a:endParaRPr lang="en-US" sz="2400" dirty="0"/>
+                <a:endParaRPr lang="en-US" sz="2400" dirty="0">
+                  <a:latin typeface="Trebuchet MS" panose="020B0603020202020204" pitchFamily="34" charset="0"/>
+                </a:endParaRPr>
               </a:p>
               <a:p>
                 <a14:m>
@@ -13658,23 +13634,33 @@
                   </m:oMath>
                 </a14:m>
                 <a:r>
-                  <a:rPr lang="en-US" sz="2400" dirty="0"/>
+                  <a:rPr lang="en-US" sz="2400" dirty="0">
+                    <a:latin typeface="Trebuchet MS" panose="020B0603020202020204" pitchFamily="34" charset="0"/>
+                  </a:rPr>
                   <a:t> – </a:t>
                 </a:r>
                 <a:r>
-                  <a:rPr lang="bg-BG" sz="2400" dirty="0"/>
+                  <a:rPr lang="bg-BG" sz="2400" dirty="0">
+                    <a:latin typeface="Trebuchet MS" panose="020B0603020202020204" pitchFamily="34" charset="0"/>
+                  </a:rPr>
                   <a:t>данните от симулацията за момент </a:t>
                 </a:r>
                 <a:r>
-                  <a:rPr lang="en-US" sz="2400" dirty="0" err="1"/>
+                  <a:rPr lang="en-US" sz="2400" dirty="0" err="1">
+                    <a:latin typeface="Trebuchet MS" panose="020B0603020202020204" pitchFamily="34" charset="0"/>
+                  </a:rPr>
                   <a:t>i</a:t>
                 </a:r>
                 <a:r>
-                  <a:rPr lang="en-US" sz="2400" dirty="0"/>
+                  <a:rPr lang="en-US" sz="2400" dirty="0">
+                    <a:latin typeface="Trebuchet MS" panose="020B0603020202020204" pitchFamily="34" charset="0"/>
+                  </a:rPr>
                   <a:t> </a:t>
                 </a:r>
                 <a:r>
-                  <a:rPr lang="bg-BG" sz="2400" dirty="0"/>
+                  <a:rPr lang="bg-BG" sz="2400" dirty="0">
+                    <a:latin typeface="Trebuchet MS" panose="020B0603020202020204" pitchFamily="34" charset="0"/>
+                  </a:rPr>
                   <a:t>з</a:t>
                 </a:r>
                 <a14:m>
@@ -13695,10 +13681,14 @@
                     </m:r>
                   </m:oMath>
                 </a14:m>
-                <a:endParaRPr lang="bg-BG" sz="2400" dirty="0"/>
+                <a:endParaRPr lang="bg-BG" sz="2400" dirty="0">
+                  <a:latin typeface="Trebuchet MS" panose="020B0603020202020204" pitchFamily="34" charset="0"/>
+                </a:endParaRPr>
               </a:p>
               <a:p>
-                <a:endParaRPr lang="en-US" sz="2400" dirty="0"/>
+                <a:endParaRPr lang="en-US" sz="2400" dirty="0">
+                  <a:latin typeface="Trebuchet MS" panose="020B0603020202020204" pitchFamily="34" charset="0"/>
+                </a:endParaRPr>
               </a:p>
             </p:txBody>
           </p:sp>
@@ -13723,7 +13713,7 @@
               <a:blipFill>
                 <a:blip r:embed="rId6"/>
                 <a:stretch>
-                  <a:fillRect l="-1527" t="-3101" r="-204"/>
+                  <a:fillRect l="-1527" t="-3101"/>
                 </a:stretch>
               </a:blipFill>
             </p:spPr>
@@ -13816,7 +13806,7 @@
               <a:buNone/>
             </a:pPr>
             <a:r>
-              <a:rPr lang="bg-BG" sz="5300">
+              <a:rPr lang="bg-BG" sz="5300" dirty="0">
                 <a:latin typeface="Trebuchet MS"/>
                 <a:ea typeface="Trebuchet MS"/>
                 <a:cs typeface="Trebuchet MS"/>
@@ -13864,7 +13854,7 @@
         <p:spPr>
           <a:xfrm>
             <a:off x="1260600" y="2370675"/>
-            <a:ext cx="4214400" cy="3527700"/>
+            <a:ext cx="4384062" cy="3527700"/>
           </a:xfrm>
           <a:prstGeom prst="rect">
             <a:avLst/>
@@ -13881,80 +13871,70 @@
           <a:lstStyle/>
           <a:p>
             <a:pPr lvl="0">
-              <a:lnSpc>
-                <a:spcPct val="115000"/>
-              </a:lnSpc>
               <a:spcBef>
                 <a:spcPts val="0"/>
               </a:spcBef>
               <a:buNone/>
             </a:pPr>
             <a:r>
-              <a:rPr lang="bg-BG" sz="2400"/>
+              <a:rPr lang="bg-BG" sz="2400" dirty="0">
+                <a:latin typeface="Trebuchet MS" panose="020B0603020202020204" pitchFamily="34" charset="0"/>
+              </a:rPr>
               <a:t>Комбинираме двата метода.</a:t>
             </a:r>
           </a:p>
           <a:p>
             <a:pPr lvl="0">
-              <a:lnSpc>
-                <a:spcPct val="115000"/>
-              </a:lnSpc>
               <a:spcBef>
                 <a:spcPts val="0"/>
               </a:spcBef>
               <a:buNone/>
             </a:pPr>
             <a:r>
-              <a:rPr lang="bg-BG" sz="2400"/>
+              <a:rPr lang="bg-BG" sz="2400" dirty="0">
+                <a:latin typeface="Trebuchet MS" panose="020B0603020202020204" pitchFamily="34" charset="0"/>
+              </a:rPr>
               <a:t>Оптимизираме функцията на най-малките квадрати.</a:t>
             </a:r>
           </a:p>
           <a:p>
             <a:pPr lvl="0" rtl="0">
-              <a:lnSpc>
-                <a:spcPct val="115000"/>
-              </a:lnSpc>
               <a:spcBef>
                 <a:spcPts val="0"/>
               </a:spcBef>
               <a:buNone/>
             </a:pPr>
             <a:r>
-              <a:rPr lang="bg-BG" sz="2400"/>
-              <a:t>Търсим най-оптималното</a:t>
-            </a:r>
-            <a:r>
-              <a:rPr lang="bg-BG"/>
-              <a:t> </a:t>
-            </a:r>
-            <a:r>
-              <a:rPr lang="bg-BG" sz="2400">
+              <a:rPr lang="bg-BG" sz="2400" dirty="0">
+                <a:latin typeface="Trebuchet MS" panose="020B0603020202020204" pitchFamily="34" charset="0"/>
+              </a:rPr>
+              <a:t>Търсим най-оптималното </a:t>
+            </a:r>
+            <a:r>
+              <a:rPr lang="bg-BG" sz="2400" dirty="0">
                 <a:solidFill>
                   <a:schemeClr val="dk1"/>
                 </a:solidFill>
-                <a:latin typeface="Trebuchet MS"/>
+                <a:latin typeface="Trebuchet MS" panose="020B0603020202020204" pitchFamily="34" charset="0"/>
                 <a:ea typeface="Trebuchet MS"/>
                 <a:cs typeface="Trebuchet MS"/>
                 <a:sym typeface="Trebuchet MS"/>
               </a:rPr>
-              <a:t>ꞵ, това с минимална грешка.</a:t>
+              <a:t>ꞵ - това с минимална грешка.</a:t>
             </a:r>
           </a:p>
           <a:p>
             <a:pPr lvl="0">
-              <a:lnSpc>
-                <a:spcPct val="115000"/>
-              </a:lnSpc>
               <a:spcBef>
                 <a:spcPts val="0"/>
               </a:spcBef>
               <a:buNone/>
             </a:pPr>
-            <a:endParaRPr sz="2400">
+            <a:endParaRPr sz="2400" dirty="0">
               <a:solidFill>
                 <a:schemeClr val="dk1"/>
               </a:solidFill>
-              <a:latin typeface="Trebuchet MS"/>
+              <a:latin typeface="Trebuchet MS" panose="020B0603020202020204" pitchFamily="34" charset="0"/>
               <a:ea typeface="Trebuchet MS"/>
               <a:cs typeface="Trebuchet MS"/>
               <a:sym typeface="Trebuchet MS"/>

</xml_diff>